<commit_message>
Add extruder temperature control
</commit_message>
<xml_diff>
--- a/documentation/introduction/Overview.pptx
+++ b/documentation/introduction/Overview.pptx
@@ -5,10 +5,11 @@
     <p:sldMasterId id="2147483648" r:id="rId1"/>
   </p:sldMasterIdLst>
   <p:notesMasterIdLst>
-    <p:notesMasterId r:id="rId3"/>
+    <p:notesMasterId r:id="rId4"/>
   </p:notesMasterIdLst>
   <p:sldIdLst>
     <p:sldId id="256" r:id="rId2"/>
+    <p:sldId id="257" r:id="rId3"/>
   </p:sldIdLst>
   <p:sldSz cx="12192000" cy="6858000"/>
   <p:notesSz cx="6858000" cy="9144000"/>
@@ -107,6 +108,11 @@
       </a:defRPr>
     </a:lvl9pPr>
   </p:defaultTextStyle>
+  <p:extLst>
+    <p:ext uri="{EFAFB233-063F-42B5-8137-9DF3F51BA10A}">
+      <p15:sldGuideLst xmlns:p15="http://schemas.microsoft.com/office/powerpoint/2012/main"/>
+    </p:ext>
+  </p:extLst>
 </p:presentation>
 </file>
 
@@ -192,7 +198,7 @@
           <a:p>
             <a:fld id="{940293B1-7298-4496-B3F7-4F805AF6023B}" type="datetimeFigureOut">
               <a:rPr lang="nl-BE" smtClean="0"/>
-              <a:t>3/08/2025</a:t>
+              <a:t>3/09/2025</a:t>
             </a:fld>
             <a:endParaRPr lang="nl-BE"/>
           </a:p>
@@ -693,7 +699,7 @@
           <a:p>
             <a:fld id="{34E79C7B-B6BB-426C-A819-3DDF9175E064}" type="datetimeFigureOut">
               <a:rPr lang="nl-BE" smtClean="0"/>
-              <a:t>3/08/2025</a:t>
+              <a:t>3/09/2025</a:t>
             </a:fld>
             <a:endParaRPr lang="nl-BE"/>
           </a:p>
@@ -893,7 +899,7 @@
           <a:p>
             <a:fld id="{34E79C7B-B6BB-426C-A819-3DDF9175E064}" type="datetimeFigureOut">
               <a:rPr lang="nl-BE" smtClean="0"/>
-              <a:t>3/08/2025</a:t>
+              <a:t>3/09/2025</a:t>
             </a:fld>
             <a:endParaRPr lang="nl-BE"/>
           </a:p>
@@ -1103,7 +1109,7 @@
           <a:p>
             <a:fld id="{34E79C7B-B6BB-426C-A819-3DDF9175E064}" type="datetimeFigureOut">
               <a:rPr lang="nl-BE" smtClean="0"/>
-              <a:t>3/08/2025</a:t>
+              <a:t>3/09/2025</a:t>
             </a:fld>
             <a:endParaRPr lang="nl-BE"/>
           </a:p>
@@ -1303,7 +1309,7 @@
           <a:p>
             <a:fld id="{34E79C7B-B6BB-426C-A819-3DDF9175E064}" type="datetimeFigureOut">
               <a:rPr lang="nl-BE" smtClean="0"/>
-              <a:t>3/08/2025</a:t>
+              <a:t>3/09/2025</a:t>
             </a:fld>
             <a:endParaRPr lang="nl-BE"/>
           </a:p>
@@ -1579,7 +1585,7 @@
           <a:p>
             <a:fld id="{34E79C7B-B6BB-426C-A819-3DDF9175E064}" type="datetimeFigureOut">
               <a:rPr lang="nl-BE" smtClean="0"/>
-              <a:t>3/08/2025</a:t>
+              <a:t>3/09/2025</a:t>
             </a:fld>
             <a:endParaRPr lang="nl-BE"/>
           </a:p>
@@ -1847,7 +1853,7 @@
           <a:p>
             <a:fld id="{34E79C7B-B6BB-426C-A819-3DDF9175E064}" type="datetimeFigureOut">
               <a:rPr lang="nl-BE" smtClean="0"/>
-              <a:t>3/08/2025</a:t>
+              <a:t>3/09/2025</a:t>
             </a:fld>
             <a:endParaRPr lang="nl-BE"/>
           </a:p>
@@ -2262,7 +2268,7 @@
           <a:p>
             <a:fld id="{34E79C7B-B6BB-426C-A819-3DDF9175E064}" type="datetimeFigureOut">
               <a:rPr lang="nl-BE" smtClean="0"/>
-              <a:t>3/08/2025</a:t>
+              <a:t>3/09/2025</a:t>
             </a:fld>
             <a:endParaRPr lang="nl-BE"/>
           </a:p>
@@ -2404,7 +2410,7 @@
           <a:p>
             <a:fld id="{34E79C7B-B6BB-426C-A819-3DDF9175E064}" type="datetimeFigureOut">
               <a:rPr lang="nl-BE" smtClean="0"/>
-              <a:t>3/08/2025</a:t>
+              <a:t>3/09/2025</a:t>
             </a:fld>
             <a:endParaRPr lang="nl-BE"/>
           </a:p>
@@ -2517,7 +2523,7 @@
           <a:p>
             <a:fld id="{34E79C7B-B6BB-426C-A819-3DDF9175E064}" type="datetimeFigureOut">
               <a:rPr lang="nl-BE" smtClean="0"/>
-              <a:t>3/08/2025</a:t>
+              <a:t>3/09/2025</a:t>
             </a:fld>
             <a:endParaRPr lang="nl-BE"/>
           </a:p>
@@ -2830,7 +2836,7 @@
           <a:p>
             <a:fld id="{34E79C7B-B6BB-426C-A819-3DDF9175E064}" type="datetimeFigureOut">
               <a:rPr lang="nl-BE" smtClean="0"/>
-              <a:t>3/08/2025</a:t>
+              <a:t>3/09/2025</a:t>
             </a:fld>
             <a:endParaRPr lang="nl-BE"/>
           </a:p>
@@ -3119,7 +3125,7 @@
           <a:p>
             <a:fld id="{34E79C7B-B6BB-426C-A819-3DDF9175E064}" type="datetimeFigureOut">
               <a:rPr lang="nl-BE" smtClean="0"/>
-              <a:t>3/08/2025</a:t>
+              <a:t>3/09/2025</a:t>
             </a:fld>
             <a:endParaRPr lang="nl-BE"/>
           </a:p>
@@ -3362,7 +3368,7 @@
           <a:p>
             <a:fld id="{34E79C7B-B6BB-426C-A819-3DDF9175E064}" type="datetimeFigureOut">
               <a:rPr lang="nl-BE" smtClean="0"/>
-              <a:t>3/08/2025</a:t>
+              <a:t>3/09/2025</a:t>
             </a:fld>
             <a:endParaRPr lang="nl-BE"/>
           </a:p>
@@ -3839,7 +3845,7 @@
             <a:lstStyle/>
             <a:p>
               <a:pPr algn="ctr"/>
-              <a:endParaRPr lang="nl-BE"/>
+              <a:endParaRPr lang="nl-BE" noProof="1"/>
             </a:p>
           </p:txBody>
         </p:sp>
@@ -3883,7 +3889,7 @@
             <a:lstStyle/>
             <a:p>
               <a:pPr algn="ctr"/>
-              <a:endParaRPr lang="nl-BE"/>
+              <a:endParaRPr lang="nl-BE" noProof="1"/>
             </a:p>
           </p:txBody>
         </p:sp>
@@ -3929,7 +3935,7 @@
             <a:lstStyle/>
             <a:p>
               <a:pPr algn="ctr"/>
-              <a:endParaRPr lang="nl-BE"/>
+              <a:endParaRPr lang="nl-BE" noProof="1"/>
             </a:p>
           </p:txBody>
         </p:sp>
@@ -3994,7 +4000,7 @@
             <a:lstStyle/>
             <a:p>
               <a:pPr algn="ctr"/>
-              <a:endParaRPr lang="nl-BE"/>
+              <a:endParaRPr lang="nl-BE" noProof="1"/>
             </a:p>
           </p:txBody>
         </p:sp>
@@ -4038,7 +4044,7 @@
             <a:lstStyle/>
             <a:p>
               <a:pPr algn="ctr"/>
-              <a:endParaRPr lang="nl-BE"/>
+              <a:endParaRPr lang="nl-BE" noProof="1"/>
             </a:p>
           </p:txBody>
         </p:sp>
@@ -4084,7 +4090,7 @@
             <a:lstStyle/>
             <a:p>
               <a:pPr algn="ctr"/>
-              <a:endParaRPr lang="nl-BE"/>
+              <a:endParaRPr lang="nl-BE" noProof="1"/>
             </a:p>
           </p:txBody>
         </p:sp>
@@ -4149,7 +4155,7 @@
             <a:lstStyle/>
             <a:p>
               <a:pPr algn="ctr"/>
-              <a:endParaRPr lang="nl-BE"/>
+              <a:endParaRPr lang="nl-BE" noProof="1"/>
             </a:p>
           </p:txBody>
         </p:sp>
@@ -4193,7 +4199,7 @@
             <a:lstStyle/>
             <a:p>
               <a:pPr algn="ctr"/>
-              <a:endParaRPr lang="nl-BE"/>
+              <a:endParaRPr lang="nl-BE" noProof="1"/>
             </a:p>
           </p:txBody>
         </p:sp>
@@ -4239,7 +4245,7 @@
             <a:lstStyle/>
             <a:p>
               <a:pPr algn="ctr"/>
-              <a:endParaRPr lang="nl-BE"/>
+              <a:endParaRPr lang="nl-BE" noProof="1"/>
             </a:p>
           </p:txBody>
         </p:sp>
@@ -4304,7 +4310,7 @@
             <a:lstStyle/>
             <a:p>
               <a:pPr algn="ctr"/>
-              <a:endParaRPr lang="nl-BE"/>
+              <a:endParaRPr lang="nl-BE" noProof="1"/>
             </a:p>
           </p:txBody>
         </p:sp>
@@ -4348,7 +4354,7 @@
             <a:lstStyle/>
             <a:p>
               <a:pPr algn="ctr"/>
-              <a:endParaRPr lang="nl-BE"/>
+              <a:endParaRPr lang="nl-BE" noProof="1"/>
             </a:p>
           </p:txBody>
         </p:sp>
@@ -4394,7 +4400,7 @@
             <a:lstStyle/>
             <a:p>
               <a:pPr algn="ctr"/>
-              <a:endParaRPr lang="nl-BE"/>
+              <a:endParaRPr lang="nl-BE" noProof="1"/>
             </a:p>
           </p:txBody>
         </p:sp>
@@ -4662,10 +4668,9 @@
           <a:p>
             <a:pPr algn="ctr"/>
             <a:r>
-              <a:rPr lang="en-US" sz="2400" b="1" dirty="0"/>
+              <a:rPr lang="nl-BE" sz="2400" b="1" noProof="1"/>
               <a:t>GRBL</a:t>
             </a:r>
-            <a:endParaRPr lang="nl-BE" sz="2400" b="1" dirty="0"/>
           </a:p>
         </p:txBody>
       </p:sp>
@@ -4699,10 +4704,9 @@
           <a:p>
             <a:pPr algn="ctr"/>
             <a:r>
-              <a:rPr lang="en-US" b="1" cap="small" dirty="0"/>
+              <a:rPr lang="nl-BE" b="1" cap="small" noProof="1"/>
               <a:t>Arduino Mega</a:t>
             </a:r>
-            <a:endParaRPr lang="nl-BE" b="1" cap="small" dirty="0"/>
           </a:p>
         </p:txBody>
       </p:sp>
@@ -4747,14 +4751,9 @@
           <a:p>
             <a:pPr algn="ctr"/>
             <a:r>
-              <a:rPr lang="en-US" sz="2400" b="1" cap="small" dirty="0" err="1"/>
-              <a:t>Gcode</a:t>
-            </a:r>
-            <a:r>
-              <a:rPr lang="en-US" sz="2400" b="1" cap="small" dirty="0"/>
-              <a:t> Sender</a:t>
-            </a:r>
-            <a:endParaRPr lang="nl-BE" sz="2400" b="1" cap="small" dirty="0"/>
+              <a:rPr lang="nl-BE" sz="2400" b="1" cap="small" noProof="1"/>
+              <a:t>Gcode Sender</a:t>
+            </a:r>
           </a:p>
         </p:txBody>
       </p:sp>
@@ -4788,10 +4787,9 @@
           <a:p>
             <a:pPr algn="ctr"/>
             <a:r>
-              <a:rPr lang="en-US" b="1" cap="small" dirty="0"/>
+              <a:rPr lang="nl-BE" b="1" cap="small" noProof="1"/>
               <a:t>Laptop</a:t>
             </a:r>
-            <a:endParaRPr lang="nl-BE" b="1" cap="small" dirty="0"/>
           </a:p>
         </p:txBody>
       </p:sp>
@@ -4840,7 +4838,7 @@
           <a:lstStyle/>
           <a:p>
             <a:pPr algn="ctr"/>
-            <a:endParaRPr lang="nl-BE"/>
+            <a:endParaRPr lang="nl-BE" noProof="1"/>
           </a:p>
         </p:txBody>
       </p:sp>
@@ -4886,7 +4884,7 @@
           <a:lstStyle/>
           <a:p>
             <a:pPr algn="ctr"/>
-            <a:endParaRPr lang="nl-BE"/>
+            <a:endParaRPr lang="nl-BE" noProof="1"/>
           </a:p>
         </p:txBody>
       </p:sp>
@@ -4935,7 +4933,7 @@
           <a:lstStyle/>
           <a:p>
             <a:pPr algn="ctr"/>
-            <a:endParaRPr lang="nl-BE"/>
+            <a:endParaRPr lang="nl-BE" noProof="1"/>
           </a:p>
         </p:txBody>
       </p:sp>
@@ -5052,10 +5050,9 @@
           <a:lstStyle/>
           <a:p>
             <a:r>
-              <a:rPr lang="en-US" cap="small" dirty="0" err="1"/>
+              <a:rPr lang="nl-BE" cap="small" noProof="1"/>
               <a:t>ster.gcode</a:t>
             </a:r>
-            <a:endParaRPr lang="nl-BE" cap="small" dirty="0"/>
           </a:p>
         </p:txBody>
       </p:sp>
@@ -5088,10 +5085,9 @@
           <a:lstStyle/>
           <a:p>
             <a:r>
-              <a:rPr lang="en-US" cap="small" dirty="0" err="1"/>
+              <a:rPr lang="nl-BE" cap="small" noProof="1"/>
               <a:t>Hartje.gcode</a:t>
             </a:r>
-            <a:endParaRPr lang="nl-BE" cap="small" dirty="0"/>
           </a:p>
         </p:txBody>
       </p:sp>
@@ -5124,18 +5120,13 @@
           <a:lstStyle/>
           <a:p>
             <a:r>
-              <a:rPr lang="en-US" sz="1400" cap="small" dirty="0"/>
+              <a:rPr lang="nl-BE" sz="1400" cap="small" noProof="1"/>
               <a:t>…</a:t>
             </a:r>
             <a:r>
-              <a:rPr lang="en-US" cap="small" dirty="0"/>
-              <a:t>.</a:t>
-            </a:r>
-            <a:r>
-              <a:rPr lang="en-US" cap="small" dirty="0" err="1"/>
-              <a:t>gcode</a:t>
-            </a:r>
-            <a:endParaRPr lang="nl-BE" cap="small" dirty="0"/>
+              <a:rPr lang="nl-BE" cap="small" noProof="1"/>
+              <a:t>.gcode</a:t>
+            </a:r>
           </a:p>
         </p:txBody>
       </p:sp>
@@ -5179,7 +5170,7 @@
           <a:lstStyle/>
           <a:p>
             <a:pPr algn="ctr"/>
-            <a:endParaRPr lang="nl-BE"/>
+            <a:endParaRPr lang="nl-BE" noProof="1"/>
           </a:p>
         </p:txBody>
       </p:sp>
@@ -5213,14 +5204,9 @@
           <a:p>
             <a:pPr algn="ctr"/>
             <a:r>
-              <a:rPr lang="en-US" cap="small" dirty="0" err="1"/>
-              <a:t>Ultimaker</a:t>
-            </a:r>
-            <a:r>
-              <a:rPr lang="en-US" cap="small" dirty="0"/>
-              <a:t> Slicer</a:t>
-            </a:r>
-            <a:endParaRPr lang="nl-BE" cap="small" dirty="0"/>
+              <a:rPr lang="nl-BE" cap="small" noProof="1"/>
+              <a:t>Ultimaker Slicer</a:t>
+            </a:r>
           </a:p>
         </p:txBody>
       </p:sp>
@@ -5385,7 +5371,7 @@
           <a:lstStyle/>
           <a:p>
             <a:pPr algn="ctr"/>
-            <a:endParaRPr lang="nl-BE"/>
+            <a:endParaRPr lang="nl-BE" noProof="1"/>
           </a:p>
         </p:txBody>
       </p:sp>
@@ -5419,10 +5405,9 @@
           <a:p>
             <a:pPr algn="ctr"/>
             <a:r>
-              <a:rPr lang="en-US" b="1" cap="small" dirty="0"/>
+              <a:rPr lang="nl-BE" b="1" cap="small" noProof="1"/>
               <a:t>Ender V3</a:t>
             </a:r>
-            <a:endParaRPr lang="nl-BE" b="1" cap="small" dirty="0"/>
           </a:p>
         </p:txBody>
       </p:sp>
@@ -5430,6 +5415,1128 @@
     <p:extLst>
       <p:ext uri="{BB962C8B-B14F-4D97-AF65-F5344CB8AC3E}">
         <p14:creationId xmlns:p14="http://schemas.microsoft.com/office/powerpoint/2010/main" val="248827699"/>
+      </p:ext>
+    </p:extLst>
+  </p:cSld>
+  <p:clrMapOvr>
+    <a:masterClrMapping/>
+  </p:clrMapOvr>
+</p:sld>
+</file>
+
+<file path=ppt/slides/slide2.xml><?xml version="1.0" encoding="utf-8"?>
+<p:sld xmlns:a="http://schemas.openxmlformats.org/drawingml/2006/main" xmlns:r="http://schemas.openxmlformats.org/officeDocument/2006/relationships" xmlns:p="http://schemas.openxmlformats.org/presentationml/2006/main">
+  <p:cSld>
+    <p:spTree>
+      <p:nvGrpSpPr>
+        <p:cNvPr id="1" name=""/>
+        <p:cNvGrpSpPr/>
+        <p:nvPr/>
+      </p:nvGrpSpPr>
+      <p:grpSpPr>
+        <a:xfrm>
+          <a:off x="0" y="0"/>
+          <a:ext cx="0" cy="0"/>
+          <a:chOff x="0" y="0"/>
+          <a:chExt cx="0" cy="0"/>
+        </a:xfrm>
+      </p:grpSpPr>
+      <p:grpSp>
+        <p:nvGrpSpPr>
+          <p:cNvPr id="8" name="Groep 7">
+            <a:extLst>
+              <a:ext uri="{FF2B5EF4-FFF2-40B4-BE49-F238E27FC236}">
+                <a16:creationId xmlns:a16="http://schemas.microsoft.com/office/drawing/2014/main" id="{E44EEE19-CA31-DF33-22A2-B40A45229791}"/>
+              </a:ext>
+            </a:extLst>
+          </p:cNvPr>
+          <p:cNvGrpSpPr/>
+          <p:nvPr/>
+        </p:nvGrpSpPr>
+        <p:grpSpPr>
+          <a:xfrm>
+            <a:off x="2682240" y="2211088"/>
+            <a:ext cx="6716977" cy="1283952"/>
+            <a:chOff x="2682240" y="2211088"/>
+            <a:chExt cx="6716977" cy="1283952"/>
+          </a:xfrm>
+        </p:grpSpPr>
+        <p:sp>
+          <p:nvSpPr>
+            <p:cNvPr id="5" name="Rechthoek: afgeschuinde bovenhoeken 4">
+              <a:extLst>
+                <a:ext uri="{FF2B5EF4-FFF2-40B4-BE49-F238E27FC236}">
+                  <a16:creationId xmlns:a16="http://schemas.microsoft.com/office/drawing/2014/main" id="{800E8942-F450-556E-E306-10439001E40F}"/>
+                </a:ext>
+              </a:extLst>
+            </p:cNvPr>
+            <p:cNvSpPr/>
+            <p:nvPr/>
+          </p:nvSpPr>
+          <p:spPr>
+            <a:xfrm rot="16200000">
+              <a:off x="5914373" y="10195"/>
+              <a:ext cx="1283952" cy="5685737"/>
+            </a:xfrm>
+            <a:prstGeom prst="snip2SameRect">
+              <a:avLst/>
+            </a:prstGeom>
+            <a:solidFill>
+              <a:schemeClr val="bg2">
+                <a:lumMod val="75000"/>
+              </a:schemeClr>
+            </a:solidFill>
+            <a:ln>
+              <a:solidFill>
+                <a:schemeClr val="tx1"/>
+              </a:solidFill>
+            </a:ln>
+          </p:spPr>
+          <p:style>
+            <a:lnRef idx="2">
+              <a:schemeClr val="accent1">
+                <a:shade val="15000"/>
+              </a:schemeClr>
+            </a:lnRef>
+            <a:fillRef idx="1">
+              <a:schemeClr val="accent1"/>
+            </a:fillRef>
+            <a:effectRef idx="0">
+              <a:schemeClr val="accent1"/>
+            </a:effectRef>
+            <a:fontRef idx="minor">
+              <a:schemeClr val="lt1"/>
+            </a:fontRef>
+          </p:style>
+          <p:txBody>
+            <a:bodyPr rtlCol="0" anchor="ctr"/>
+            <a:lstStyle/>
+            <a:p>
+              <a:pPr algn="ctr"/>
+              <a:endParaRPr lang="nl-BE"/>
+            </a:p>
+          </p:txBody>
+        </p:sp>
+        <p:sp>
+          <p:nvSpPr>
+            <p:cNvPr id="7" name="Trapezium 6">
+              <a:extLst>
+                <a:ext uri="{FF2B5EF4-FFF2-40B4-BE49-F238E27FC236}">
+                  <a16:creationId xmlns:a16="http://schemas.microsoft.com/office/drawing/2014/main" id="{D139EE9C-6055-2ADA-936D-9CEFDC33F647}"/>
+                </a:ext>
+              </a:extLst>
+            </p:cNvPr>
+            <p:cNvSpPr/>
+            <p:nvPr/>
+          </p:nvSpPr>
+          <p:spPr>
+            <a:xfrm rot="16200000">
+              <a:off x="3037197" y="2337443"/>
+              <a:ext cx="321326" cy="1031240"/>
+            </a:xfrm>
+            <a:prstGeom prst="trapezoid">
+              <a:avLst/>
+            </a:prstGeom>
+            <a:solidFill>
+              <a:schemeClr val="bg2">
+                <a:lumMod val="75000"/>
+              </a:schemeClr>
+            </a:solidFill>
+            <a:ln>
+              <a:solidFill>
+                <a:schemeClr val="tx1"/>
+              </a:solidFill>
+            </a:ln>
+          </p:spPr>
+          <p:style>
+            <a:lnRef idx="2">
+              <a:schemeClr val="accent1">
+                <a:shade val="15000"/>
+              </a:schemeClr>
+            </a:lnRef>
+            <a:fillRef idx="1">
+              <a:schemeClr val="accent1"/>
+            </a:fillRef>
+            <a:effectRef idx="0">
+              <a:schemeClr val="accent1"/>
+            </a:effectRef>
+            <a:fontRef idx="minor">
+              <a:schemeClr val="lt1"/>
+            </a:fontRef>
+          </p:style>
+          <p:txBody>
+            <a:bodyPr rtlCol="0" anchor="ctr"/>
+            <a:lstStyle/>
+            <a:p>
+              <a:pPr algn="ctr"/>
+              <a:endParaRPr lang="nl-BE"/>
+            </a:p>
+          </p:txBody>
+        </p:sp>
+      </p:grpSp>
+      <p:sp>
+        <p:nvSpPr>
+          <p:cNvPr id="9" name="Rechthoek 8">
+            <a:extLst>
+              <a:ext uri="{FF2B5EF4-FFF2-40B4-BE49-F238E27FC236}">
+                <a16:creationId xmlns:a16="http://schemas.microsoft.com/office/drawing/2014/main" id="{89A6A468-9F49-9D01-026F-B6956557BC73}"/>
+              </a:ext>
+            </a:extLst>
+          </p:cNvPr>
+          <p:cNvSpPr/>
+          <p:nvPr/>
+        </p:nvSpPr>
+        <p:spPr>
+          <a:xfrm>
+            <a:off x="3982720" y="2042159"/>
+            <a:ext cx="5328920" cy="158123"/>
+          </a:xfrm>
+          <a:prstGeom prst="rect">
+            <a:avLst/>
+          </a:prstGeom>
+          <a:solidFill>
+            <a:srgbClr val="FFC000"/>
+          </a:solidFill>
+        </p:spPr>
+        <p:style>
+          <a:lnRef idx="2">
+            <a:schemeClr val="accent2">
+              <a:shade val="15000"/>
+            </a:schemeClr>
+          </a:lnRef>
+          <a:fillRef idx="1">
+            <a:schemeClr val="accent2"/>
+          </a:fillRef>
+          <a:effectRef idx="0">
+            <a:schemeClr val="accent2"/>
+          </a:effectRef>
+          <a:fontRef idx="minor">
+            <a:schemeClr val="lt1"/>
+          </a:fontRef>
+        </p:style>
+        <p:txBody>
+          <a:bodyPr rtlCol="0" anchor="ctr"/>
+          <a:lstStyle/>
+          <a:p>
+            <a:pPr algn="ctr"/>
+            <a:endParaRPr lang="nl-BE"/>
+          </a:p>
+        </p:txBody>
+      </p:sp>
+      <p:sp>
+        <p:nvSpPr>
+          <p:cNvPr id="10" name="Rechthoek 9">
+            <a:extLst>
+              <a:ext uri="{FF2B5EF4-FFF2-40B4-BE49-F238E27FC236}">
+                <a16:creationId xmlns:a16="http://schemas.microsoft.com/office/drawing/2014/main" id="{17855C2E-864E-1A90-1ACD-D6E0B18C9A99}"/>
+              </a:ext>
+            </a:extLst>
+          </p:cNvPr>
+          <p:cNvSpPr/>
+          <p:nvPr/>
+        </p:nvSpPr>
+        <p:spPr>
+          <a:xfrm>
+            <a:off x="3982720" y="1693495"/>
+            <a:ext cx="5328920" cy="158123"/>
+          </a:xfrm>
+          <a:prstGeom prst="rect">
+            <a:avLst/>
+          </a:prstGeom>
+          <a:solidFill>
+            <a:schemeClr val="bg2">
+              <a:lumMod val="90000"/>
+            </a:schemeClr>
+          </a:solidFill>
+          <a:ln>
+            <a:solidFill>
+              <a:schemeClr val="bg2">
+                <a:lumMod val="75000"/>
+              </a:schemeClr>
+            </a:solidFill>
+          </a:ln>
+        </p:spPr>
+        <p:style>
+          <a:lnRef idx="2">
+            <a:schemeClr val="accent2">
+              <a:shade val="15000"/>
+            </a:schemeClr>
+          </a:lnRef>
+          <a:fillRef idx="1">
+            <a:schemeClr val="accent2"/>
+          </a:fillRef>
+          <a:effectRef idx="0">
+            <a:schemeClr val="accent2"/>
+          </a:effectRef>
+          <a:fontRef idx="minor">
+            <a:schemeClr val="lt1"/>
+          </a:fontRef>
+        </p:style>
+        <p:txBody>
+          <a:bodyPr rtlCol="0" anchor="ctr"/>
+          <a:lstStyle/>
+          <a:p>
+            <a:pPr algn="ctr"/>
+            <a:endParaRPr lang="nl-BE" dirty="0"/>
+          </a:p>
+        </p:txBody>
+      </p:sp>
+      <p:sp>
+        <p:nvSpPr>
+          <p:cNvPr id="11" name="Rechthoek 10">
+            <a:extLst>
+              <a:ext uri="{FF2B5EF4-FFF2-40B4-BE49-F238E27FC236}">
+                <a16:creationId xmlns:a16="http://schemas.microsoft.com/office/drawing/2014/main" id="{CDAFA516-3B1A-07E7-4D77-B0345533035C}"/>
+              </a:ext>
+            </a:extLst>
+          </p:cNvPr>
+          <p:cNvSpPr/>
+          <p:nvPr/>
+        </p:nvSpPr>
+        <p:spPr>
+          <a:xfrm>
+            <a:off x="3982720" y="1868150"/>
+            <a:ext cx="5328920" cy="158123"/>
+          </a:xfrm>
+          <a:prstGeom prst="rect">
+            <a:avLst/>
+          </a:prstGeom>
+          <a:solidFill>
+            <a:schemeClr val="bg1">
+              <a:lumMod val="95000"/>
+            </a:schemeClr>
+          </a:solidFill>
+          <a:ln>
+            <a:solidFill>
+              <a:schemeClr val="bg2">
+                <a:lumMod val="25000"/>
+              </a:schemeClr>
+            </a:solidFill>
+          </a:ln>
+        </p:spPr>
+        <p:style>
+          <a:lnRef idx="2">
+            <a:schemeClr val="accent2">
+              <a:shade val="15000"/>
+            </a:schemeClr>
+          </a:lnRef>
+          <a:fillRef idx="1">
+            <a:schemeClr val="accent2"/>
+          </a:fillRef>
+          <a:effectRef idx="0">
+            <a:schemeClr val="accent2"/>
+          </a:effectRef>
+          <a:fontRef idx="minor">
+            <a:schemeClr val="lt1"/>
+          </a:fontRef>
+        </p:style>
+        <p:txBody>
+          <a:bodyPr rtlCol="0" anchor="ctr"/>
+          <a:lstStyle/>
+          <a:p>
+            <a:pPr algn="ctr"/>
+            <a:endParaRPr lang="nl-BE" dirty="0"/>
+          </a:p>
+        </p:txBody>
+      </p:sp>
+      <p:grpSp>
+        <p:nvGrpSpPr>
+          <p:cNvPr id="22" name="Groep 21">
+            <a:extLst>
+              <a:ext uri="{FF2B5EF4-FFF2-40B4-BE49-F238E27FC236}">
+                <a16:creationId xmlns:a16="http://schemas.microsoft.com/office/drawing/2014/main" id="{2E6A4662-83A9-7366-E41D-B57FB5A295C6}"/>
+              </a:ext>
+            </a:extLst>
+          </p:cNvPr>
+          <p:cNvGrpSpPr/>
+          <p:nvPr/>
+        </p:nvGrpSpPr>
+        <p:grpSpPr>
+          <a:xfrm>
+            <a:off x="9172840" y="1894316"/>
+            <a:ext cx="2104760" cy="109850"/>
+            <a:chOff x="9124899" y="1971347"/>
+            <a:chExt cx="2104760" cy="109850"/>
+          </a:xfrm>
+        </p:grpSpPr>
+        <p:sp>
+          <p:nvSpPr>
+            <p:cNvPr id="13" name="Rechthoek: afgeronde bovenhoeken 12">
+              <a:extLst>
+                <a:ext uri="{FF2B5EF4-FFF2-40B4-BE49-F238E27FC236}">
+                  <a16:creationId xmlns:a16="http://schemas.microsoft.com/office/drawing/2014/main" id="{80F48FA1-B29B-0DD2-6F37-3C74F535C531}"/>
+                </a:ext>
+              </a:extLst>
+            </p:cNvPr>
+            <p:cNvSpPr/>
+            <p:nvPr/>
+          </p:nvSpPr>
+          <p:spPr>
+            <a:xfrm rot="16200000">
+              <a:off x="9207134" y="1889112"/>
+              <a:ext cx="109850" cy="274320"/>
+            </a:xfrm>
+            <a:prstGeom prst="round2SameRect">
+              <a:avLst>
+                <a:gd name="adj1" fmla="val 35186"/>
+                <a:gd name="adj2" fmla="val 0"/>
+              </a:avLst>
+            </a:prstGeom>
+          </p:spPr>
+          <p:style>
+            <a:lnRef idx="2">
+              <a:schemeClr val="dk1">
+                <a:shade val="15000"/>
+              </a:schemeClr>
+            </a:lnRef>
+            <a:fillRef idx="1">
+              <a:schemeClr val="dk1"/>
+            </a:fillRef>
+            <a:effectRef idx="0">
+              <a:schemeClr val="dk1"/>
+            </a:effectRef>
+            <a:fontRef idx="minor">
+              <a:schemeClr val="lt1"/>
+            </a:fontRef>
+          </p:style>
+          <p:txBody>
+            <a:bodyPr rtlCol="0" anchor="ctr"/>
+            <a:lstStyle/>
+            <a:p>
+              <a:pPr algn="ctr"/>
+              <a:endParaRPr lang="nl-BE"/>
+            </a:p>
+          </p:txBody>
+        </p:sp>
+        <p:cxnSp>
+          <p:nvCxnSpPr>
+            <p:cNvPr id="15" name="Rechte verbindingslijn 14">
+              <a:extLst>
+                <a:ext uri="{FF2B5EF4-FFF2-40B4-BE49-F238E27FC236}">
+                  <a16:creationId xmlns:a16="http://schemas.microsoft.com/office/drawing/2014/main" id="{7748B966-6ACD-BCF9-99A6-1C69F2F8F6FE}"/>
+                </a:ext>
+              </a:extLst>
+            </p:cNvPr>
+            <p:cNvCxnSpPr>
+              <a:cxnSpLocks/>
+            </p:cNvCxnSpPr>
+            <p:nvPr/>
+          </p:nvCxnSpPr>
+          <p:spPr>
+            <a:xfrm>
+              <a:off x="9407158" y="2004986"/>
+              <a:ext cx="1822501" cy="0"/>
+            </a:xfrm>
+            <a:prstGeom prst="line">
+              <a:avLst/>
+            </a:prstGeom>
+          </p:spPr>
+          <p:style>
+            <a:lnRef idx="2">
+              <a:schemeClr val="dk1"/>
+            </a:lnRef>
+            <a:fillRef idx="0">
+              <a:schemeClr val="dk1"/>
+            </a:fillRef>
+            <a:effectRef idx="1">
+              <a:schemeClr val="dk1"/>
+            </a:effectRef>
+            <a:fontRef idx="minor">
+              <a:schemeClr val="tx1"/>
+            </a:fontRef>
+          </p:style>
+        </p:cxnSp>
+        <p:cxnSp>
+          <p:nvCxnSpPr>
+            <p:cNvPr id="16" name="Rechte verbindingslijn 15">
+              <a:extLst>
+                <a:ext uri="{FF2B5EF4-FFF2-40B4-BE49-F238E27FC236}">
+                  <a16:creationId xmlns:a16="http://schemas.microsoft.com/office/drawing/2014/main" id="{8F6EF992-D459-4F47-8B9F-795F56DD5CE6}"/>
+                </a:ext>
+              </a:extLst>
+            </p:cNvPr>
+            <p:cNvCxnSpPr>
+              <a:cxnSpLocks/>
+            </p:cNvCxnSpPr>
+            <p:nvPr/>
+          </p:nvCxnSpPr>
+          <p:spPr>
+            <a:xfrm>
+              <a:off x="9407158" y="2052610"/>
+              <a:ext cx="1822501" cy="0"/>
+            </a:xfrm>
+            <a:prstGeom prst="line">
+              <a:avLst/>
+            </a:prstGeom>
+            <a:ln>
+              <a:solidFill>
+                <a:srgbClr val="FF0000"/>
+              </a:solidFill>
+            </a:ln>
+          </p:spPr>
+          <p:style>
+            <a:lnRef idx="2">
+              <a:schemeClr val="dk1"/>
+            </a:lnRef>
+            <a:fillRef idx="0">
+              <a:schemeClr val="dk1"/>
+            </a:fillRef>
+            <a:effectRef idx="1">
+              <a:schemeClr val="dk1"/>
+            </a:effectRef>
+            <a:fontRef idx="minor">
+              <a:schemeClr val="tx1"/>
+            </a:fontRef>
+          </p:style>
+        </p:cxnSp>
+      </p:grpSp>
+      <p:sp>
+        <p:nvSpPr>
+          <p:cNvPr id="17" name="Tekstvak 16">
+            <a:extLst>
+              <a:ext uri="{FF2B5EF4-FFF2-40B4-BE49-F238E27FC236}">
+                <a16:creationId xmlns:a16="http://schemas.microsoft.com/office/drawing/2014/main" id="{8943F7FC-1B18-8F1A-5E95-6AD08ADB5D9F}"/>
+              </a:ext>
+            </a:extLst>
+          </p:cNvPr>
+          <p:cNvSpPr txBox="1"/>
+          <p:nvPr/>
+        </p:nvSpPr>
+        <p:spPr>
+          <a:xfrm>
+            <a:off x="11277600" y="1819500"/>
+            <a:ext cx="425116" cy="369332"/>
+          </a:xfrm>
+          <a:prstGeom prst="rect">
+            <a:avLst/>
+          </a:prstGeom>
+          <a:noFill/>
+        </p:spPr>
+        <p:txBody>
+          <a:bodyPr wrap="none" rtlCol="0">
+            <a:spAutoFit/>
+          </a:bodyPr>
+          <a:lstStyle/>
+          <a:p>
+            <a:r>
+              <a:rPr lang="en-US" b="1" dirty="0"/>
+              <a:t>T0</a:t>
+            </a:r>
+            <a:endParaRPr lang="nl-BE" b="1" dirty="0"/>
+          </a:p>
+        </p:txBody>
+      </p:sp>
+      <p:grpSp>
+        <p:nvGrpSpPr>
+          <p:cNvPr id="21" name="Groep 20">
+            <a:extLst>
+              <a:ext uri="{FF2B5EF4-FFF2-40B4-BE49-F238E27FC236}">
+                <a16:creationId xmlns:a16="http://schemas.microsoft.com/office/drawing/2014/main" id="{0F517BF1-00DD-56E6-2CB8-38747ECEA099}"/>
+              </a:ext>
+            </a:extLst>
+          </p:cNvPr>
+          <p:cNvGrpSpPr/>
+          <p:nvPr/>
+        </p:nvGrpSpPr>
+        <p:grpSpPr>
+          <a:xfrm rot="2230993">
+            <a:off x="3084347" y="3155587"/>
+            <a:ext cx="641786" cy="174009"/>
+            <a:chOff x="9277299" y="2091667"/>
+            <a:chExt cx="641786" cy="174009"/>
+          </a:xfrm>
+        </p:grpSpPr>
+        <p:sp>
+          <p:nvSpPr>
+            <p:cNvPr id="18" name="Rechthoek: afgeronde bovenhoeken 17">
+              <a:extLst>
+                <a:ext uri="{FF2B5EF4-FFF2-40B4-BE49-F238E27FC236}">
+                  <a16:creationId xmlns:a16="http://schemas.microsoft.com/office/drawing/2014/main" id="{41A27255-0E54-420D-4615-F32B5451F0B7}"/>
+                </a:ext>
+              </a:extLst>
+            </p:cNvPr>
+            <p:cNvSpPr/>
+            <p:nvPr/>
+          </p:nvSpPr>
+          <p:spPr>
+            <a:xfrm rot="16200000">
+              <a:off x="9327454" y="2041512"/>
+              <a:ext cx="174009" cy="274320"/>
+            </a:xfrm>
+            <a:prstGeom prst="round2SameRect">
+              <a:avLst>
+                <a:gd name="adj1" fmla="val 35186"/>
+                <a:gd name="adj2" fmla="val 0"/>
+              </a:avLst>
+            </a:prstGeom>
+          </p:spPr>
+          <p:style>
+            <a:lnRef idx="2">
+              <a:schemeClr val="dk1">
+                <a:shade val="15000"/>
+              </a:schemeClr>
+            </a:lnRef>
+            <a:fillRef idx="1">
+              <a:schemeClr val="dk1"/>
+            </a:fillRef>
+            <a:effectRef idx="0">
+              <a:schemeClr val="dk1"/>
+            </a:effectRef>
+            <a:fontRef idx="minor">
+              <a:schemeClr val="lt1"/>
+            </a:fontRef>
+          </p:style>
+          <p:txBody>
+            <a:bodyPr rtlCol="0" anchor="ctr"/>
+            <a:lstStyle/>
+            <a:p>
+              <a:pPr algn="ctr"/>
+              <a:endParaRPr lang="nl-BE"/>
+            </a:p>
+          </p:txBody>
+        </p:sp>
+        <p:cxnSp>
+          <p:nvCxnSpPr>
+            <p:cNvPr id="19" name="Rechte verbindingslijn 18">
+              <a:extLst>
+                <a:ext uri="{FF2B5EF4-FFF2-40B4-BE49-F238E27FC236}">
+                  <a16:creationId xmlns:a16="http://schemas.microsoft.com/office/drawing/2014/main" id="{80000472-40BF-09FA-2D78-6419B7188160}"/>
+                </a:ext>
+              </a:extLst>
+            </p:cNvPr>
+            <p:cNvCxnSpPr>
+              <a:cxnSpLocks/>
+            </p:cNvCxnSpPr>
+            <p:nvPr/>
+          </p:nvCxnSpPr>
+          <p:spPr>
+            <a:xfrm>
+              <a:off x="9559558" y="2135161"/>
+              <a:ext cx="359527" cy="0"/>
+            </a:xfrm>
+            <a:prstGeom prst="line">
+              <a:avLst/>
+            </a:prstGeom>
+          </p:spPr>
+          <p:style>
+            <a:lnRef idx="2">
+              <a:schemeClr val="dk1"/>
+            </a:lnRef>
+            <a:fillRef idx="0">
+              <a:schemeClr val="dk1"/>
+            </a:fillRef>
+            <a:effectRef idx="1">
+              <a:schemeClr val="dk1"/>
+            </a:effectRef>
+            <a:fontRef idx="minor">
+              <a:schemeClr val="tx1"/>
+            </a:fontRef>
+          </p:style>
+        </p:cxnSp>
+        <p:cxnSp>
+          <p:nvCxnSpPr>
+            <p:cNvPr id="20" name="Rechte verbindingslijn 19">
+              <a:extLst>
+                <a:ext uri="{FF2B5EF4-FFF2-40B4-BE49-F238E27FC236}">
+                  <a16:creationId xmlns:a16="http://schemas.microsoft.com/office/drawing/2014/main" id="{73602C23-9D93-EC48-9EF7-C6DE53225753}"/>
+                </a:ext>
+              </a:extLst>
+            </p:cNvPr>
+            <p:cNvCxnSpPr>
+              <a:cxnSpLocks/>
+            </p:cNvCxnSpPr>
+            <p:nvPr/>
+          </p:nvCxnSpPr>
+          <p:spPr>
+            <a:xfrm>
+              <a:off x="9556909" y="2216122"/>
+              <a:ext cx="345243" cy="0"/>
+            </a:xfrm>
+            <a:prstGeom prst="line">
+              <a:avLst/>
+            </a:prstGeom>
+            <a:ln>
+              <a:solidFill>
+                <a:srgbClr val="FF0000"/>
+              </a:solidFill>
+            </a:ln>
+          </p:spPr>
+          <p:style>
+            <a:lnRef idx="2">
+              <a:schemeClr val="dk1"/>
+            </a:lnRef>
+            <a:fillRef idx="0">
+              <a:schemeClr val="dk1"/>
+            </a:fillRef>
+            <a:effectRef idx="1">
+              <a:schemeClr val="dk1"/>
+            </a:effectRef>
+            <a:fontRef idx="minor">
+              <a:schemeClr val="tx1"/>
+            </a:fontRef>
+          </p:style>
+        </p:cxnSp>
+      </p:grpSp>
+      <p:sp>
+        <p:nvSpPr>
+          <p:cNvPr id="27" name="Tekstvak 26">
+            <a:extLst>
+              <a:ext uri="{FF2B5EF4-FFF2-40B4-BE49-F238E27FC236}">
+                <a16:creationId xmlns:a16="http://schemas.microsoft.com/office/drawing/2014/main" id="{09859A2F-E663-3726-95C9-6748B3B03D46}"/>
+              </a:ext>
+            </a:extLst>
+          </p:cNvPr>
+          <p:cNvSpPr txBox="1"/>
+          <p:nvPr/>
+        </p:nvSpPr>
+        <p:spPr>
+          <a:xfrm>
+            <a:off x="3563343" y="3395800"/>
+            <a:ext cx="425116" cy="369332"/>
+          </a:xfrm>
+          <a:prstGeom prst="rect">
+            <a:avLst/>
+          </a:prstGeom>
+          <a:noFill/>
+        </p:spPr>
+        <p:txBody>
+          <a:bodyPr wrap="none" rtlCol="0">
+            <a:spAutoFit/>
+          </a:bodyPr>
+          <a:lstStyle/>
+          <a:p>
+            <a:r>
+              <a:rPr lang="en-US" b="1" dirty="0"/>
+              <a:t>T1</a:t>
+            </a:r>
+            <a:endParaRPr lang="nl-BE" b="1" dirty="0"/>
+          </a:p>
+        </p:txBody>
+      </p:sp>
+      <p:grpSp>
+        <p:nvGrpSpPr>
+          <p:cNvPr id="31" name="Groep 30">
+            <a:extLst>
+              <a:ext uri="{FF2B5EF4-FFF2-40B4-BE49-F238E27FC236}">
+                <a16:creationId xmlns:a16="http://schemas.microsoft.com/office/drawing/2014/main" id="{AE75E2A4-FB3A-E8B4-6DF3-2A31EC7A29F7}"/>
+              </a:ext>
+            </a:extLst>
+          </p:cNvPr>
+          <p:cNvGrpSpPr/>
+          <p:nvPr/>
+        </p:nvGrpSpPr>
+        <p:grpSpPr>
+          <a:xfrm rot="10800000">
+            <a:off x="4019824" y="3505845"/>
+            <a:ext cx="5328920" cy="506787"/>
+            <a:chOff x="4886960" y="4715216"/>
+            <a:chExt cx="5328920" cy="506787"/>
+          </a:xfrm>
+        </p:grpSpPr>
+        <p:sp>
+          <p:nvSpPr>
+            <p:cNvPr id="28" name="Rechthoek 27">
+              <a:extLst>
+                <a:ext uri="{FF2B5EF4-FFF2-40B4-BE49-F238E27FC236}">
+                  <a16:creationId xmlns:a16="http://schemas.microsoft.com/office/drawing/2014/main" id="{AA30DB8E-B024-D37E-07E3-F32D45DF8111}"/>
+                </a:ext>
+              </a:extLst>
+            </p:cNvPr>
+            <p:cNvSpPr/>
+            <p:nvPr/>
+          </p:nvSpPr>
+          <p:spPr>
+            <a:xfrm>
+              <a:off x="4886960" y="5063880"/>
+              <a:ext cx="5328920" cy="158123"/>
+            </a:xfrm>
+            <a:prstGeom prst="rect">
+              <a:avLst/>
+            </a:prstGeom>
+            <a:solidFill>
+              <a:srgbClr val="FFC000"/>
+            </a:solidFill>
+          </p:spPr>
+          <p:style>
+            <a:lnRef idx="2">
+              <a:schemeClr val="accent2">
+                <a:shade val="15000"/>
+              </a:schemeClr>
+            </a:lnRef>
+            <a:fillRef idx="1">
+              <a:schemeClr val="accent2"/>
+            </a:fillRef>
+            <a:effectRef idx="0">
+              <a:schemeClr val="accent2"/>
+            </a:effectRef>
+            <a:fontRef idx="minor">
+              <a:schemeClr val="lt1"/>
+            </a:fontRef>
+          </p:style>
+          <p:txBody>
+            <a:bodyPr rtlCol="0" anchor="ctr"/>
+            <a:lstStyle/>
+            <a:p>
+              <a:pPr algn="ctr"/>
+              <a:endParaRPr lang="nl-BE"/>
+            </a:p>
+          </p:txBody>
+        </p:sp>
+        <p:sp>
+          <p:nvSpPr>
+            <p:cNvPr id="29" name="Rechthoek 28">
+              <a:extLst>
+                <a:ext uri="{FF2B5EF4-FFF2-40B4-BE49-F238E27FC236}">
+                  <a16:creationId xmlns:a16="http://schemas.microsoft.com/office/drawing/2014/main" id="{8A203F00-1511-F836-9C95-D69058ADFF8D}"/>
+                </a:ext>
+              </a:extLst>
+            </p:cNvPr>
+            <p:cNvSpPr/>
+            <p:nvPr/>
+          </p:nvSpPr>
+          <p:spPr>
+            <a:xfrm>
+              <a:off x="4886960" y="4715216"/>
+              <a:ext cx="5328920" cy="158123"/>
+            </a:xfrm>
+            <a:prstGeom prst="rect">
+              <a:avLst/>
+            </a:prstGeom>
+            <a:solidFill>
+              <a:schemeClr val="bg2">
+                <a:lumMod val="90000"/>
+              </a:schemeClr>
+            </a:solidFill>
+            <a:ln>
+              <a:solidFill>
+                <a:schemeClr val="bg2">
+                  <a:lumMod val="75000"/>
+                </a:schemeClr>
+              </a:solidFill>
+            </a:ln>
+          </p:spPr>
+          <p:style>
+            <a:lnRef idx="2">
+              <a:schemeClr val="accent2">
+                <a:shade val="15000"/>
+              </a:schemeClr>
+            </a:lnRef>
+            <a:fillRef idx="1">
+              <a:schemeClr val="accent2"/>
+            </a:fillRef>
+            <a:effectRef idx="0">
+              <a:schemeClr val="accent2"/>
+            </a:effectRef>
+            <a:fontRef idx="minor">
+              <a:schemeClr val="lt1"/>
+            </a:fontRef>
+          </p:style>
+          <p:txBody>
+            <a:bodyPr rtlCol="0" anchor="ctr"/>
+            <a:lstStyle/>
+            <a:p>
+              <a:pPr algn="ctr"/>
+              <a:endParaRPr lang="nl-BE" dirty="0"/>
+            </a:p>
+          </p:txBody>
+        </p:sp>
+        <p:sp>
+          <p:nvSpPr>
+            <p:cNvPr id="30" name="Rechthoek 29">
+              <a:extLst>
+                <a:ext uri="{FF2B5EF4-FFF2-40B4-BE49-F238E27FC236}">
+                  <a16:creationId xmlns:a16="http://schemas.microsoft.com/office/drawing/2014/main" id="{62C27193-E353-3206-2C3C-002210975646}"/>
+                </a:ext>
+              </a:extLst>
+            </p:cNvPr>
+            <p:cNvSpPr/>
+            <p:nvPr/>
+          </p:nvSpPr>
+          <p:spPr>
+            <a:xfrm>
+              <a:off x="4886960" y="4889871"/>
+              <a:ext cx="5328920" cy="158123"/>
+            </a:xfrm>
+            <a:prstGeom prst="rect">
+              <a:avLst/>
+            </a:prstGeom>
+            <a:solidFill>
+              <a:schemeClr val="bg1">
+                <a:lumMod val="95000"/>
+              </a:schemeClr>
+            </a:solidFill>
+            <a:ln>
+              <a:solidFill>
+                <a:schemeClr val="bg2">
+                  <a:lumMod val="25000"/>
+                </a:schemeClr>
+              </a:solidFill>
+            </a:ln>
+          </p:spPr>
+          <p:style>
+            <a:lnRef idx="2">
+              <a:schemeClr val="accent2">
+                <a:shade val="15000"/>
+              </a:schemeClr>
+            </a:lnRef>
+            <a:fillRef idx="1">
+              <a:schemeClr val="accent2"/>
+            </a:fillRef>
+            <a:effectRef idx="0">
+              <a:schemeClr val="accent2"/>
+            </a:effectRef>
+            <a:fontRef idx="minor">
+              <a:schemeClr val="lt1"/>
+            </a:fontRef>
+          </p:style>
+          <p:txBody>
+            <a:bodyPr rtlCol="0" anchor="ctr"/>
+            <a:lstStyle/>
+            <a:p>
+              <a:pPr algn="ctr"/>
+              <a:endParaRPr lang="nl-BE" dirty="0"/>
+            </a:p>
+          </p:txBody>
+        </p:sp>
+      </p:grpSp>
+      <p:cxnSp>
+        <p:nvCxnSpPr>
+          <p:cNvPr id="32" name="Rechte verbindingslijn 31">
+            <a:extLst>
+              <a:ext uri="{FF2B5EF4-FFF2-40B4-BE49-F238E27FC236}">
+                <a16:creationId xmlns:a16="http://schemas.microsoft.com/office/drawing/2014/main" id="{31F9DBAE-E258-3F80-5DB4-5A503082967B}"/>
+              </a:ext>
+            </a:extLst>
+          </p:cNvPr>
+          <p:cNvCxnSpPr>
+            <a:cxnSpLocks/>
+          </p:cNvCxnSpPr>
+          <p:nvPr/>
+        </p:nvCxnSpPr>
+        <p:spPr>
+          <a:xfrm>
+            <a:off x="9351393" y="3748130"/>
+            <a:ext cx="1098167" cy="0"/>
+          </a:xfrm>
+          <a:prstGeom prst="line">
+            <a:avLst/>
+          </a:prstGeom>
+        </p:spPr>
+        <p:style>
+          <a:lnRef idx="2">
+            <a:schemeClr val="dk1"/>
+          </a:lnRef>
+          <a:fillRef idx="0">
+            <a:schemeClr val="dk1"/>
+          </a:fillRef>
+          <a:effectRef idx="1">
+            <a:schemeClr val="dk1"/>
+          </a:effectRef>
+          <a:fontRef idx="minor">
+            <a:schemeClr val="tx1"/>
+          </a:fontRef>
+        </p:style>
+      </p:cxnSp>
+      <p:cxnSp>
+        <p:nvCxnSpPr>
+          <p:cNvPr id="33" name="Rechte verbindingslijn 32">
+            <a:extLst>
+              <a:ext uri="{FF2B5EF4-FFF2-40B4-BE49-F238E27FC236}">
+                <a16:creationId xmlns:a16="http://schemas.microsoft.com/office/drawing/2014/main" id="{98C9D0BE-4517-AFFD-241F-491755DA5D4B}"/>
+              </a:ext>
+            </a:extLst>
+          </p:cNvPr>
+          <p:cNvCxnSpPr>
+            <a:cxnSpLocks/>
+          </p:cNvCxnSpPr>
+          <p:nvPr/>
+        </p:nvCxnSpPr>
+        <p:spPr>
+          <a:xfrm>
+            <a:off x="9354832" y="3786515"/>
+            <a:ext cx="1100816" cy="0"/>
+          </a:xfrm>
+          <a:prstGeom prst="line">
+            <a:avLst/>
+          </a:prstGeom>
+          <a:ln>
+            <a:solidFill>
+              <a:srgbClr val="FF0000"/>
+            </a:solidFill>
+          </a:ln>
+        </p:spPr>
+        <p:style>
+          <a:lnRef idx="2">
+            <a:schemeClr val="dk1"/>
+          </a:lnRef>
+          <a:fillRef idx="0">
+            <a:schemeClr val="dk1"/>
+          </a:fillRef>
+          <a:effectRef idx="1">
+            <a:schemeClr val="dk1"/>
+          </a:effectRef>
+          <a:fontRef idx="minor">
+            <a:schemeClr val="tx1"/>
+          </a:fontRef>
+        </p:style>
+      </p:cxnSp>
+      <p:sp>
+        <p:nvSpPr>
+          <p:cNvPr id="37" name="Tekstvak 36">
+            <a:extLst>
+              <a:ext uri="{FF2B5EF4-FFF2-40B4-BE49-F238E27FC236}">
+                <a16:creationId xmlns:a16="http://schemas.microsoft.com/office/drawing/2014/main" id="{FCA3132E-C90E-A293-9780-9080E2E65CD2}"/>
+              </a:ext>
+            </a:extLst>
+          </p:cNvPr>
+          <p:cNvSpPr txBox="1"/>
+          <p:nvPr/>
+        </p:nvSpPr>
+        <p:spPr>
+          <a:xfrm>
+            <a:off x="10449560" y="3544562"/>
+            <a:ext cx="1742440" cy="369332"/>
+          </a:xfrm>
+          <a:prstGeom prst="rect">
+            <a:avLst/>
+          </a:prstGeom>
+          <a:noFill/>
+        </p:spPr>
+        <p:txBody>
+          <a:bodyPr wrap="square" rtlCol="0">
+            <a:spAutoFit/>
+          </a:bodyPr>
+          <a:lstStyle/>
+          <a:p>
+            <a:r>
+              <a:rPr lang="en-US" b="1" dirty="0"/>
+              <a:t>Syringe Heater</a:t>
+            </a:r>
+            <a:endParaRPr lang="nl-BE" b="1" dirty="0"/>
+          </a:p>
+        </p:txBody>
+      </p:sp>
+      <p:sp>
+        <p:nvSpPr>
+          <p:cNvPr id="40" name="Tekstvak 39">
+            <a:extLst>
+              <a:ext uri="{FF2B5EF4-FFF2-40B4-BE49-F238E27FC236}">
+                <a16:creationId xmlns:a16="http://schemas.microsoft.com/office/drawing/2014/main" id="{1101DACF-D82A-B6F9-B719-87C0FEAB786D}"/>
+              </a:ext>
+            </a:extLst>
+          </p:cNvPr>
+          <p:cNvSpPr txBox="1"/>
+          <p:nvPr/>
+        </p:nvSpPr>
+        <p:spPr>
+          <a:xfrm>
+            <a:off x="859181" y="2273981"/>
+            <a:ext cx="2089202" cy="369332"/>
+          </a:xfrm>
+          <a:prstGeom prst="rect">
+            <a:avLst/>
+          </a:prstGeom>
+          <a:noFill/>
+        </p:spPr>
+        <p:txBody>
+          <a:bodyPr wrap="square" rtlCol="0">
+            <a:spAutoFit/>
+          </a:bodyPr>
+          <a:lstStyle/>
+          <a:p>
+            <a:r>
+              <a:rPr lang="en-US" b="1" dirty="0"/>
+              <a:t>Extruder Heater</a:t>
+            </a:r>
+            <a:endParaRPr lang="nl-BE" b="1" dirty="0"/>
+          </a:p>
+        </p:txBody>
+      </p:sp>
+      <p:cxnSp>
+        <p:nvCxnSpPr>
+          <p:cNvPr id="2" name="Rechte verbindingslijn 1">
+            <a:extLst>
+              <a:ext uri="{FF2B5EF4-FFF2-40B4-BE49-F238E27FC236}">
+                <a16:creationId xmlns:a16="http://schemas.microsoft.com/office/drawing/2014/main" id="{95001262-01B0-26B3-DC78-F91A3D6167E8}"/>
+              </a:ext>
+            </a:extLst>
+          </p:cNvPr>
+          <p:cNvCxnSpPr>
+            <a:cxnSpLocks/>
+          </p:cNvCxnSpPr>
+          <p:nvPr/>
+        </p:nvCxnSpPr>
+        <p:spPr>
+          <a:xfrm>
+            <a:off x="1577985" y="2619543"/>
+            <a:ext cx="1098167" cy="0"/>
+          </a:xfrm>
+          <a:prstGeom prst="line">
+            <a:avLst/>
+          </a:prstGeom>
+        </p:spPr>
+        <p:style>
+          <a:lnRef idx="2">
+            <a:schemeClr val="dk1"/>
+          </a:lnRef>
+          <a:fillRef idx="0">
+            <a:schemeClr val="dk1"/>
+          </a:fillRef>
+          <a:effectRef idx="1">
+            <a:schemeClr val="dk1"/>
+          </a:effectRef>
+          <a:fontRef idx="minor">
+            <a:schemeClr val="tx1"/>
+          </a:fontRef>
+        </p:style>
+      </p:cxnSp>
+      <p:cxnSp>
+        <p:nvCxnSpPr>
+          <p:cNvPr id="3" name="Rechte verbindingslijn 2">
+            <a:extLst>
+              <a:ext uri="{FF2B5EF4-FFF2-40B4-BE49-F238E27FC236}">
+                <a16:creationId xmlns:a16="http://schemas.microsoft.com/office/drawing/2014/main" id="{91BDFE48-96C4-CB11-0520-6509ABE09C60}"/>
+              </a:ext>
+            </a:extLst>
+          </p:cNvPr>
+          <p:cNvCxnSpPr>
+            <a:cxnSpLocks/>
+          </p:cNvCxnSpPr>
+          <p:nvPr/>
+        </p:nvCxnSpPr>
+        <p:spPr>
+          <a:xfrm>
+            <a:off x="1581424" y="2657928"/>
+            <a:ext cx="1100816" cy="0"/>
+          </a:xfrm>
+          <a:prstGeom prst="line">
+            <a:avLst/>
+          </a:prstGeom>
+          <a:ln>
+            <a:solidFill>
+              <a:srgbClr val="FF0000"/>
+            </a:solidFill>
+          </a:ln>
+        </p:spPr>
+        <p:style>
+          <a:lnRef idx="2">
+            <a:schemeClr val="dk1"/>
+          </a:lnRef>
+          <a:fillRef idx="0">
+            <a:schemeClr val="dk1"/>
+          </a:fillRef>
+          <a:effectRef idx="1">
+            <a:schemeClr val="dk1"/>
+          </a:effectRef>
+          <a:fontRef idx="minor">
+            <a:schemeClr val="tx1"/>
+          </a:fontRef>
+        </p:style>
+      </p:cxnSp>
+    </p:spTree>
+    <p:extLst>
+      <p:ext uri="{BB962C8B-B14F-4D97-AF65-F5344CB8AC3E}">
+        <p14:creationId xmlns:p14="http://schemas.microsoft.com/office/powerpoint/2010/main" val="3727591495"/>
       </p:ext>
     </p:extLst>
   </p:cSld>

</xml_diff>